<commit_message>
Resize images and try lighter gray
</commit_message>
<xml_diff>
--- a/images/illustrations.pptx
+++ b/images/illustrations.pptx
@@ -2986,11 +2986,15 @@
             <a:avLst/>
           </a:prstGeom>
           <a:solidFill>
-            <a:srgbClr val="00B050"/>
+            <a:schemeClr val="bg1">
+              <a:lumMod val="65000"/>
+            </a:schemeClr>
           </a:solidFill>
           <a:ln w="28575">
             <a:solidFill>
-              <a:srgbClr val="00B050"/>
+              <a:schemeClr val="bg1">
+                <a:lumMod val="65000"/>
+              </a:schemeClr>
             </a:solidFill>
           </a:ln>
         </p:spPr>
@@ -3639,22 +3643,18 @@
             <a:r>
               <a:rPr lang="en-US" dirty="0" smtClean="0">
                 <a:solidFill>
-                  <a:srgbClr val="00B050"/>
+                  <a:schemeClr val="bg1">
+                    <a:lumMod val="65000"/>
+                  </a:schemeClr>
                 </a:solidFill>
               </a:rPr>
-              <a:t>Azure DevOps </a:t>
-            </a:r>
-            <a:r>
-              <a:rPr lang="en-US" dirty="0" smtClean="0">
-                <a:solidFill>
-                  <a:srgbClr val="00B050"/>
-                </a:solidFill>
-              </a:rPr>
-              <a:t>Project X</a:t>
+              <a:t>Azure DevOps Project X</a:t>
             </a:r>
             <a:endParaRPr lang="en-US" dirty="0">
               <a:solidFill>
-                <a:srgbClr val="00B050"/>
+                <a:schemeClr val="bg1">
+                  <a:lumMod val="65000"/>
+                </a:schemeClr>
               </a:solidFill>
             </a:endParaRPr>
           </a:p>
@@ -3675,11 +3675,15 @@
             <a:avLst/>
           </a:prstGeom>
           <a:solidFill>
-            <a:srgbClr val="00B050"/>
+            <a:schemeClr val="bg1">
+              <a:lumMod val="65000"/>
+            </a:schemeClr>
           </a:solidFill>
           <a:ln w="28575">
             <a:solidFill>
-              <a:srgbClr val="00B050"/>
+              <a:schemeClr val="bg1">
+                <a:lumMod val="65000"/>
+              </a:schemeClr>
             </a:solidFill>
           </a:ln>
         </p:spPr>
@@ -3731,42 +3735,22 @@
           <a:lstStyle/>
           <a:p>
             <a:r>
-              <a:rPr lang="en-US" sz="1600" dirty="0" smtClean="0">
-                <a:solidFill>
-                  <a:schemeClr val="bg1"/>
-                </a:solidFill>
-              </a:rPr>
+              <a:rPr lang="en-US" sz="1600" dirty="0" smtClean="0"/>
               <a:t>Project Administrators</a:t>
             </a:r>
           </a:p>
           <a:p>
-            <a:endParaRPr lang="en-US" sz="1600" dirty="0">
-              <a:solidFill>
-                <a:schemeClr val="bg1"/>
-              </a:solidFill>
-            </a:endParaRPr>
-          </a:p>
-          <a:p>
-            <a:endParaRPr lang="en-US" sz="1600" dirty="0">
-              <a:solidFill>
-                <a:schemeClr val="bg1"/>
-              </a:solidFill>
-            </a:endParaRPr>
-          </a:p>
-          <a:p>
-            <a:r>
-              <a:rPr lang="en-US" sz="1600" dirty="0" smtClean="0">
-                <a:solidFill>
-                  <a:schemeClr val="bg1"/>
-                </a:solidFill>
-              </a:rPr>
+            <a:endParaRPr lang="en-US" sz="1600" dirty="0"/>
+          </a:p>
+          <a:p>
+            <a:endParaRPr lang="en-US" sz="1600" dirty="0"/>
+          </a:p>
+          <a:p>
+            <a:r>
+              <a:rPr lang="en-US" sz="1600" dirty="0" smtClean="0"/>
               <a:t>Contributors</a:t>
             </a:r>
-            <a:endParaRPr lang="en-US" sz="1600" dirty="0">
-              <a:solidFill>
-                <a:schemeClr val="bg1"/>
-              </a:solidFill>
-            </a:endParaRPr>
+            <a:endParaRPr lang="en-US" sz="1600" dirty="0"/>
           </a:p>
         </p:txBody>
       </p:sp>
@@ -3867,7 +3851,9 @@
             <a:r>
               <a:rPr lang="en-US" dirty="0" smtClean="0">
                 <a:solidFill>
-                  <a:srgbClr val="00B050"/>
+                  <a:schemeClr val="bg1">
+                    <a:lumMod val="65000"/>
+                  </a:schemeClr>
                 </a:solidFill>
               </a:rPr>
               <a:t>D</a:t>
@@ -3875,7 +3861,9 @@
             <a:r>
               <a:rPr lang="en-US" dirty="0" smtClean="0">
                 <a:solidFill>
-                  <a:srgbClr val="00B050"/>
+                  <a:schemeClr val="bg1">
+                    <a:lumMod val="65000"/>
+                  </a:schemeClr>
                 </a:solidFill>
                 <a:sym typeface="Webdings" panose="05030102010509060703" pitchFamily="18" charset="2"/>
               </a:rPr>
@@ -3884,14 +3872,18 @@
             <a:r>
               <a:rPr lang="en-US" dirty="0" smtClean="0">
                 <a:solidFill>
-                  <a:srgbClr val="00B050"/>
+                  <a:schemeClr val="bg1">
+                    <a:lumMod val="65000"/>
+                  </a:schemeClr>
                 </a:solidFill>
               </a:rPr>
               <a:t>RIFT CONFIG</a:t>
             </a:r>
             <a:endParaRPr lang="en-US" dirty="0">
               <a:solidFill>
-                <a:srgbClr val="00B050"/>
+                <a:schemeClr val="bg1">
+                  <a:lumMod val="65000"/>
+                </a:schemeClr>
               </a:solidFill>
             </a:endParaRPr>
           </a:p>
@@ -4020,167 +4012,87 @@
           <a:lstStyle/>
           <a:p>
             <a:r>
-              <a:rPr lang="en-US" sz="1600" dirty="0" smtClean="0">
-                <a:solidFill>
-                  <a:schemeClr val="bg1"/>
-                </a:solidFill>
-              </a:rPr>
+              <a:rPr lang="en-US" sz="1600" dirty="0" smtClean="0"/>
               <a:t>Project Administrators</a:t>
             </a:r>
           </a:p>
           <a:p>
-            <a:endParaRPr lang="en-US" sz="1000" dirty="0" smtClean="0">
-              <a:solidFill>
-                <a:schemeClr val="bg1"/>
-              </a:solidFill>
-            </a:endParaRPr>
-          </a:p>
-          <a:p>
-            <a:r>
-              <a:rPr lang="en-US" sz="1000" dirty="0">
-                <a:solidFill>
-                  <a:schemeClr val="bg1"/>
-                </a:solidFill>
-              </a:rPr>
+            <a:endParaRPr lang="en-US" sz="1000" dirty="0" smtClean="0"/>
+          </a:p>
+          <a:p>
+            <a:r>
+              <a:rPr lang="en-US" sz="1000" dirty="0"/>
               <a:t> </a:t>
             </a:r>
             <a:r>
-              <a:rPr lang="en-US" sz="1000" dirty="0" smtClean="0">
-                <a:solidFill>
-                  <a:schemeClr val="bg1"/>
-                </a:solidFill>
-              </a:rPr>
+              <a:rPr lang="en-US" sz="1000" dirty="0" smtClean="0"/>
               <a:t>          </a:t>
             </a:r>
           </a:p>
           <a:p>
-            <a:endParaRPr lang="en-US" sz="1000" dirty="0">
-              <a:solidFill>
-                <a:schemeClr val="bg1"/>
-              </a:solidFill>
-            </a:endParaRPr>
-          </a:p>
-          <a:p>
-            <a:r>
-              <a:rPr lang="en-US" sz="1600" dirty="0" smtClean="0">
-                <a:solidFill>
-                  <a:schemeClr val="bg1"/>
-                </a:solidFill>
-              </a:rPr>
+            <a:endParaRPr lang="en-US" sz="1000" dirty="0"/>
+          </a:p>
+          <a:p>
+            <a:r>
+              <a:rPr lang="en-US" sz="1600" dirty="0" smtClean="0"/>
               <a:t>Contributors</a:t>
             </a:r>
           </a:p>
           <a:p>
-            <a:endParaRPr lang="en-US" sz="1000" dirty="0" smtClean="0">
-              <a:solidFill>
-                <a:schemeClr val="bg1"/>
-              </a:solidFill>
-            </a:endParaRPr>
-          </a:p>
-          <a:p>
-            <a:r>
-              <a:rPr lang="en-US" sz="1000" dirty="0" smtClean="0">
-                <a:solidFill>
-                  <a:schemeClr val="bg1"/>
-                </a:solidFill>
-              </a:rPr>
+            <a:endParaRPr lang="en-US" sz="1000" dirty="0" smtClean="0"/>
+          </a:p>
+          <a:p>
+            <a:r>
+              <a:rPr lang="en-US" sz="1000" dirty="0" smtClean="0"/>
               <a:t>           - missing</a:t>
             </a:r>
           </a:p>
           <a:p>
-            <a:endParaRPr lang="en-US" sz="1000" dirty="0">
-              <a:solidFill>
-                <a:schemeClr val="bg1"/>
-              </a:solidFill>
-            </a:endParaRPr>
-          </a:p>
-          <a:p>
-            <a:r>
-              <a:rPr lang="en-US" sz="1000" dirty="0" smtClean="0">
-                <a:solidFill>
-                  <a:schemeClr val="bg1"/>
-                </a:solidFill>
-              </a:rPr>
+            <a:endParaRPr lang="en-US" sz="1000" dirty="0"/>
+          </a:p>
+          <a:p>
+            <a:r>
+              <a:rPr lang="en-US" sz="1000" dirty="0" smtClean="0"/>
               <a:t>           + additional</a:t>
             </a:r>
           </a:p>
           <a:p>
-            <a:endParaRPr lang="en-US" sz="1600" dirty="0" smtClean="0">
-              <a:solidFill>
-                <a:schemeClr val="bg1"/>
-              </a:solidFill>
-            </a:endParaRPr>
-          </a:p>
-          <a:p>
-            <a:r>
-              <a:rPr lang="en-US" sz="1600" dirty="0" smtClean="0">
-                <a:solidFill>
-                  <a:schemeClr val="bg1"/>
-                </a:solidFill>
-              </a:rPr>
+            <a:endParaRPr lang="en-US" sz="1600" dirty="0" smtClean="0"/>
+          </a:p>
+          <a:p>
+            <a:r>
+              <a:rPr lang="en-US" sz="1600" dirty="0" smtClean="0"/>
               <a:t>Readers</a:t>
             </a:r>
             <a:r>
-              <a:rPr lang="en-US" sz="1000" dirty="0" smtClean="0">
-                <a:solidFill>
-                  <a:schemeClr val="bg1"/>
-                </a:solidFill>
-              </a:rPr>
+              <a:rPr lang="en-US" sz="1000" dirty="0" smtClean="0"/>
               <a:t>  + additional</a:t>
             </a:r>
-            <a:endParaRPr lang="en-US" sz="1600" dirty="0" smtClean="0">
-              <a:solidFill>
-                <a:schemeClr val="bg1"/>
-              </a:solidFill>
-            </a:endParaRPr>
-          </a:p>
-          <a:p>
-            <a:endParaRPr lang="en-US" sz="1000" dirty="0" smtClean="0">
-              <a:solidFill>
-                <a:schemeClr val="bg1"/>
-              </a:solidFill>
-            </a:endParaRPr>
-          </a:p>
-          <a:p>
-            <a:r>
-              <a:rPr lang="en-US" sz="1000" dirty="0" smtClean="0">
-                <a:solidFill>
-                  <a:schemeClr val="bg1"/>
-                </a:solidFill>
-              </a:rPr>
+            <a:endParaRPr lang="en-US" sz="1600" dirty="0" smtClean="0"/>
+          </a:p>
+          <a:p>
+            <a:endParaRPr lang="en-US" sz="1000" dirty="0" smtClean="0"/>
+          </a:p>
+          <a:p>
+            <a:r>
+              <a:rPr lang="en-US" sz="1000" dirty="0" smtClean="0"/>
               <a:t>           + additional </a:t>
             </a:r>
           </a:p>
           <a:p>
-            <a:endParaRPr lang="en-US" sz="1000" dirty="0" smtClean="0">
-              <a:solidFill>
-                <a:schemeClr val="bg1"/>
-              </a:solidFill>
-            </a:endParaRPr>
-          </a:p>
-          <a:p>
-            <a:r>
-              <a:rPr lang="en-US" sz="1000" dirty="0" smtClean="0">
-                <a:solidFill>
-                  <a:schemeClr val="bg1"/>
-                </a:solidFill>
-              </a:rPr>
+            <a:endParaRPr lang="en-US" sz="1000" dirty="0" smtClean="0"/>
+          </a:p>
+          <a:p>
+            <a:r>
+              <a:rPr lang="en-US" sz="1000" dirty="0" smtClean="0"/>
               <a:t>           + additional</a:t>
             </a:r>
           </a:p>
           <a:p>
-            <a:endParaRPr lang="en-US" sz="1000" dirty="0" smtClean="0">
-              <a:solidFill>
-                <a:schemeClr val="bg1"/>
-              </a:solidFill>
-            </a:endParaRPr>
-          </a:p>
-          <a:p>
-            <a:endParaRPr lang="en-US" sz="1000" dirty="0">
-              <a:solidFill>
-                <a:schemeClr val="bg1"/>
-              </a:solidFill>
-            </a:endParaRPr>
+            <a:endParaRPr lang="en-US" sz="1000" dirty="0" smtClean="0"/>
+          </a:p>
+          <a:p>
+            <a:endParaRPr lang="en-US" sz="1000" dirty="0"/>
           </a:p>
         </p:txBody>
       </p:sp>
@@ -4404,6 +4316,79 @@
           </p:spPr>
         </p:pic>
       </p:grpSp>
+      <p:sp>
+        <p:nvSpPr>
+          <p:cNvPr id="53" name="TextBox 52"/>
+          <p:cNvSpPr txBox="1"/>
+          <p:nvPr/>
+        </p:nvSpPr>
+        <p:spPr>
+          <a:xfrm>
+            <a:off x="9492624" y="4598426"/>
+            <a:ext cx="1754968" cy="369332"/>
+          </a:xfrm>
+          <a:prstGeom prst="rect">
+            <a:avLst/>
+          </a:prstGeom>
+          <a:noFill/>
+        </p:spPr>
+        <p:txBody>
+          <a:bodyPr wrap="none" rtlCol="0">
+            <a:spAutoFit/>
+          </a:bodyPr>
+          <a:lstStyle/>
+          <a:p>
+            <a:r>
+              <a:rPr lang="en-US" dirty="0" smtClean="0">
+                <a:solidFill>
+                  <a:schemeClr val="bg1">
+                    <a:lumMod val="65000"/>
+                  </a:schemeClr>
+                </a:solidFill>
+              </a:rPr>
+              <a:t>D</a:t>
+            </a:r>
+            <a:r>
+              <a:rPr lang="en-US" dirty="0" smtClean="0">
+                <a:solidFill>
+                  <a:schemeClr val="bg1">
+                    <a:lumMod val="65000"/>
+                  </a:schemeClr>
+                </a:solidFill>
+                <a:sym typeface="Webdings" panose="05030102010509060703" pitchFamily="18" charset="2"/>
+              </a:rPr>
+              <a:t></a:t>
+            </a:r>
+            <a:r>
+              <a:rPr lang="en-US" dirty="0" smtClean="0">
+                <a:solidFill>
+                  <a:schemeClr val="bg1">
+                    <a:lumMod val="65000"/>
+                  </a:schemeClr>
+                </a:solidFill>
+              </a:rPr>
+              <a:t>RIFT </a:t>
+            </a:r>
+            <a:r>
+              <a:rPr lang="en-US" dirty="0" smtClean="0">
+                <a:solidFill>
+                  <a:schemeClr val="bg1">
+                    <a:lumMod val="65000"/>
+                  </a:schemeClr>
+                </a:solidFill>
+              </a:rPr>
+              <a:t>REPORT</a:t>
+            </a:r>
+            <a:endParaRPr lang="en-US" dirty="0">
+              <a:solidFill>
+                <a:schemeClr val="bg1">
+                  <a:lumMod val="65000"/>
+                </a:schemeClr>
+              </a:solidFill>
+            </a:endParaRPr>
+          </a:p>
+        </p:txBody>
+      </p:sp>
     </p:spTree>
     <p:extLst>
       <p:ext uri="{BB962C8B-B14F-4D97-AF65-F5344CB8AC3E}">
@@ -4449,11 +4434,15 @@
             <a:avLst/>
           </a:prstGeom>
           <a:solidFill>
-            <a:srgbClr val="00B050"/>
+            <a:schemeClr val="bg1">
+              <a:lumMod val="65000"/>
+            </a:schemeClr>
           </a:solidFill>
           <a:ln w="28575">
             <a:solidFill>
-              <a:srgbClr val="00B050"/>
+              <a:schemeClr val="bg1">
+                <a:lumMod val="65000"/>
+              </a:schemeClr>
             </a:solidFill>
           </a:ln>
         </p:spPr>
@@ -5037,7 +5026,7 @@
         </p:nvSpPr>
         <p:spPr>
           <a:xfrm>
-            <a:off x="5120611" y="4697798"/>
+            <a:off x="5138830" y="4687838"/>
             <a:ext cx="2386615" cy="369332"/>
           </a:xfrm>
           <a:prstGeom prst="rect">
@@ -5054,22 +5043,18 @@
             <a:r>
               <a:rPr lang="en-US" dirty="0" smtClean="0">
                 <a:solidFill>
-                  <a:srgbClr val="00B050"/>
+                  <a:schemeClr val="bg1">
+                    <a:lumMod val="50000"/>
+                  </a:schemeClr>
                 </a:solidFill>
               </a:rPr>
-              <a:t>Azure DevOps Project </a:t>
-            </a:r>
-            <a:r>
-              <a:rPr lang="en-US" dirty="0" smtClean="0">
-                <a:solidFill>
-                  <a:srgbClr val="00B050"/>
-                </a:solidFill>
-              </a:rPr>
-              <a:t>X</a:t>
+              <a:t>Azure DevOps Project X</a:t>
             </a:r>
             <a:endParaRPr lang="en-US" dirty="0">
               <a:solidFill>
-                <a:srgbClr val="00B050"/>
+                <a:schemeClr val="bg1">
+                  <a:lumMod val="50000"/>
+                </a:schemeClr>
               </a:solidFill>
             </a:endParaRPr>
           </a:p>
@@ -5083,18 +5068,22 @@
         </p:nvSpPr>
         <p:spPr>
           <a:xfrm rot="10800000">
-            <a:off x="838908" y="2091564"/>
+            <a:off x="838908" y="2116879"/>
             <a:ext cx="2134381" cy="1782307"/>
           </a:xfrm>
           <a:prstGeom prst="foldedCorner">
             <a:avLst/>
           </a:prstGeom>
           <a:solidFill>
-            <a:srgbClr val="00B050"/>
+            <a:schemeClr val="bg1">
+              <a:lumMod val="65000"/>
+            </a:schemeClr>
           </a:solidFill>
           <a:ln w="28575">
             <a:solidFill>
-              <a:srgbClr val="00B050"/>
+              <a:schemeClr val="bg1">
+                <a:lumMod val="65000"/>
+              </a:schemeClr>
             </a:solidFill>
           </a:ln>
         </p:spPr>
@@ -5131,7 +5120,7 @@
         </p:nvSpPr>
         <p:spPr>
           <a:xfrm>
-            <a:off x="925613" y="2392164"/>
+            <a:off x="925612" y="2363323"/>
             <a:ext cx="2047676" cy="1077218"/>
           </a:xfrm>
           <a:prstGeom prst="rect">
@@ -5146,42 +5135,22 @@
           <a:lstStyle/>
           <a:p>
             <a:r>
-              <a:rPr lang="en-US" sz="1600" dirty="0" smtClean="0">
-                <a:solidFill>
-                  <a:schemeClr val="bg1"/>
-                </a:solidFill>
-              </a:rPr>
+              <a:rPr lang="en-US" sz="1600" dirty="0" smtClean="0"/>
               <a:t>Project Administrators</a:t>
             </a:r>
           </a:p>
           <a:p>
-            <a:endParaRPr lang="en-US" sz="1600" dirty="0">
-              <a:solidFill>
-                <a:schemeClr val="bg1"/>
-              </a:solidFill>
-            </a:endParaRPr>
-          </a:p>
-          <a:p>
-            <a:endParaRPr lang="en-US" sz="1600" dirty="0">
-              <a:solidFill>
-                <a:schemeClr val="bg1"/>
-              </a:solidFill>
-            </a:endParaRPr>
-          </a:p>
-          <a:p>
-            <a:r>
-              <a:rPr lang="en-US" sz="1600" dirty="0" smtClean="0">
-                <a:solidFill>
-                  <a:schemeClr val="bg1"/>
-                </a:solidFill>
-              </a:rPr>
+            <a:endParaRPr lang="en-US" sz="1600" dirty="0"/>
+          </a:p>
+          <a:p>
+            <a:endParaRPr lang="en-US" sz="1600" dirty="0"/>
+          </a:p>
+          <a:p>
+            <a:r>
+              <a:rPr lang="en-US" sz="1600" dirty="0" smtClean="0"/>
               <a:t>Contributors</a:t>
             </a:r>
-            <a:endParaRPr lang="en-US" sz="1600" dirty="0">
-              <a:solidFill>
-                <a:schemeClr val="bg1"/>
-              </a:solidFill>
-            </a:endParaRPr>
+            <a:endParaRPr lang="en-US" sz="1600" dirty="0"/>
           </a:p>
         </p:txBody>
       </p:sp>
@@ -5282,7 +5251,9 @@
             <a:r>
               <a:rPr lang="en-US" dirty="0" smtClean="0">
                 <a:solidFill>
-                  <a:srgbClr val="00B050"/>
+                  <a:schemeClr val="bg1">
+                    <a:lumMod val="50000"/>
+                  </a:schemeClr>
                 </a:solidFill>
               </a:rPr>
               <a:t>D</a:t>
@@ -5290,7 +5261,9 @@
             <a:r>
               <a:rPr lang="en-US" dirty="0" smtClean="0">
                 <a:solidFill>
-                  <a:srgbClr val="00B050"/>
+                  <a:schemeClr val="bg1">
+                    <a:lumMod val="50000"/>
+                  </a:schemeClr>
                 </a:solidFill>
                 <a:sym typeface="Webdings" panose="05030102010509060703" pitchFamily="18" charset="2"/>
               </a:rPr>
@@ -5299,14 +5272,18 @@
             <a:r>
               <a:rPr lang="en-US" dirty="0" smtClean="0">
                 <a:solidFill>
-                  <a:srgbClr val="00B050"/>
+                  <a:schemeClr val="bg1">
+                    <a:lumMod val="50000"/>
+                  </a:schemeClr>
                 </a:solidFill>
               </a:rPr>
               <a:t>RIFT CONFIG</a:t>
             </a:r>
             <a:endParaRPr lang="en-US" dirty="0">
               <a:solidFill>
-                <a:srgbClr val="00B050"/>
+                <a:schemeClr val="bg1">
+                  <a:lumMod val="50000"/>
+                </a:schemeClr>
               </a:solidFill>
             </a:endParaRPr>
           </a:p>
@@ -5435,103 +5412,55 @@
           <a:lstStyle/>
           <a:p>
             <a:r>
-              <a:rPr lang="en-US" sz="1600" dirty="0" smtClean="0">
-                <a:solidFill>
-                  <a:schemeClr val="bg1"/>
-                </a:solidFill>
-              </a:rPr>
+              <a:rPr lang="en-US" sz="1600" dirty="0" smtClean="0"/>
               <a:t>Project Administrators</a:t>
             </a:r>
           </a:p>
           <a:p>
-            <a:endParaRPr lang="en-US" sz="1000" dirty="0" smtClean="0">
-              <a:solidFill>
-                <a:schemeClr val="bg1"/>
-              </a:solidFill>
-            </a:endParaRPr>
-          </a:p>
-          <a:p>
-            <a:r>
-              <a:rPr lang="en-US" sz="1000" dirty="0">
-                <a:solidFill>
-                  <a:schemeClr val="bg1"/>
-                </a:solidFill>
-              </a:rPr>
+            <a:endParaRPr lang="en-US" sz="1000" dirty="0" smtClean="0"/>
+          </a:p>
+          <a:p>
+            <a:r>
+              <a:rPr lang="en-US" sz="1000" dirty="0"/>
               <a:t> </a:t>
             </a:r>
             <a:r>
-              <a:rPr lang="en-US" sz="1000" dirty="0" smtClean="0">
-                <a:solidFill>
-                  <a:schemeClr val="bg1"/>
-                </a:solidFill>
-              </a:rPr>
+              <a:rPr lang="en-US" sz="1000" dirty="0" smtClean="0"/>
               <a:t>          + additional</a:t>
             </a:r>
           </a:p>
           <a:p>
-            <a:endParaRPr lang="en-US" sz="1000" dirty="0">
-              <a:solidFill>
-                <a:schemeClr val="bg1"/>
-              </a:solidFill>
-            </a:endParaRPr>
-          </a:p>
-          <a:p>
-            <a:r>
-              <a:rPr lang="en-US" sz="1600" dirty="0" smtClean="0">
-                <a:solidFill>
-                  <a:schemeClr val="bg1"/>
-                </a:solidFill>
-              </a:rPr>
+            <a:endParaRPr lang="en-US" sz="1000" dirty="0"/>
+          </a:p>
+          <a:p>
+            <a:r>
+              <a:rPr lang="en-US" sz="1600" dirty="0" smtClean="0"/>
               <a:t>Contributors</a:t>
             </a:r>
           </a:p>
           <a:p>
-            <a:endParaRPr lang="en-US" sz="1000" dirty="0" smtClean="0">
-              <a:solidFill>
-                <a:schemeClr val="bg1"/>
-              </a:solidFill>
-            </a:endParaRPr>
-          </a:p>
-          <a:p>
-            <a:r>
-              <a:rPr lang="en-US" sz="1000" dirty="0" smtClean="0">
-                <a:solidFill>
-                  <a:schemeClr val="bg1"/>
-                </a:solidFill>
-              </a:rPr>
+            <a:endParaRPr lang="en-US" sz="1000" dirty="0" smtClean="0"/>
+          </a:p>
+          <a:p>
+            <a:r>
+              <a:rPr lang="en-US" sz="1000" dirty="0" smtClean="0"/>
               <a:t>           - missing</a:t>
             </a:r>
           </a:p>
           <a:p>
-            <a:endParaRPr lang="en-US" sz="1000" dirty="0">
-              <a:solidFill>
-                <a:schemeClr val="bg1"/>
-              </a:solidFill>
-            </a:endParaRPr>
-          </a:p>
-          <a:p>
-            <a:r>
-              <a:rPr lang="en-US" sz="1000" dirty="0" smtClean="0">
-                <a:solidFill>
-                  <a:schemeClr val="bg1"/>
-                </a:solidFill>
-              </a:rPr>
+            <a:endParaRPr lang="en-US" sz="1000" dirty="0"/>
+          </a:p>
+          <a:p>
+            <a:r>
+              <a:rPr lang="en-US" sz="1000" dirty="0" smtClean="0"/>
               <a:t>           + additional</a:t>
             </a:r>
           </a:p>
           <a:p>
-            <a:endParaRPr lang="en-US" sz="1600" dirty="0" smtClean="0">
-              <a:solidFill>
-                <a:schemeClr val="bg1"/>
-              </a:solidFill>
-            </a:endParaRPr>
-          </a:p>
-          <a:p>
-            <a:endParaRPr lang="en-US" sz="1000" dirty="0">
-              <a:solidFill>
-                <a:schemeClr val="bg1"/>
-              </a:solidFill>
-            </a:endParaRPr>
+            <a:endParaRPr lang="en-US" sz="1600" dirty="0" smtClean="0"/>
+          </a:p>
+          <a:p>
+            <a:endParaRPr lang="en-US" sz="1000" dirty="0"/>
           </a:p>
         </p:txBody>
       </p:sp>
@@ -5631,6 +5560,79 @@
           </a:prstGeom>
         </p:spPr>
       </p:pic>
+      <p:sp>
+        <p:nvSpPr>
+          <p:cNvPr id="46" name="TextBox 45"/>
+          <p:cNvSpPr txBox="1"/>
+          <p:nvPr/>
+        </p:nvSpPr>
+        <p:spPr>
+          <a:xfrm>
+            <a:off x="9540233" y="3927843"/>
+            <a:ext cx="1754968" cy="369332"/>
+          </a:xfrm>
+          <a:prstGeom prst="rect">
+            <a:avLst/>
+          </a:prstGeom>
+          <a:noFill/>
+        </p:spPr>
+        <p:txBody>
+          <a:bodyPr wrap="none" rtlCol="0">
+            <a:spAutoFit/>
+          </a:bodyPr>
+          <a:lstStyle/>
+          <a:p>
+            <a:r>
+              <a:rPr lang="en-US" dirty="0" smtClean="0">
+                <a:solidFill>
+                  <a:schemeClr val="bg1">
+                    <a:lumMod val="65000"/>
+                  </a:schemeClr>
+                </a:solidFill>
+              </a:rPr>
+              <a:t>D</a:t>
+            </a:r>
+            <a:r>
+              <a:rPr lang="en-US" dirty="0" smtClean="0">
+                <a:solidFill>
+                  <a:schemeClr val="bg1">
+                    <a:lumMod val="65000"/>
+                  </a:schemeClr>
+                </a:solidFill>
+                <a:sym typeface="Webdings" panose="05030102010509060703" pitchFamily="18" charset="2"/>
+              </a:rPr>
+              <a:t></a:t>
+            </a:r>
+            <a:r>
+              <a:rPr lang="en-US" dirty="0" smtClean="0">
+                <a:solidFill>
+                  <a:schemeClr val="bg1">
+                    <a:lumMod val="65000"/>
+                  </a:schemeClr>
+                </a:solidFill>
+              </a:rPr>
+              <a:t>RIFT </a:t>
+            </a:r>
+            <a:r>
+              <a:rPr lang="en-US" dirty="0" smtClean="0">
+                <a:solidFill>
+                  <a:schemeClr val="bg1">
+                    <a:lumMod val="65000"/>
+                  </a:schemeClr>
+                </a:solidFill>
+              </a:rPr>
+              <a:t>REPORT</a:t>
+            </a:r>
+            <a:endParaRPr lang="en-US" dirty="0">
+              <a:solidFill>
+                <a:schemeClr val="bg1">
+                  <a:lumMod val="65000"/>
+                </a:schemeClr>
+              </a:solidFill>
+            </a:endParaRPr>
+          </a:p>
+        </p:txBody>
+      </p:sp>
     </p:spTree>
     <p:extLst>
       <p:ext uri="{BB962C8B-B14F-4D97-AF65-F5344CB8AC3E}">
@@ -6233,22 +6235,18 @@
             <a:r>
               <a:rPr lang="en-US" dirty="0" smtClean="0">
                 <a:solidFill>
-                  <a:srgbClr val="00B050"/>
+                  <a:schemeClr val="bg1">
+                    <a:lumMod val="65000"/>
+                  </a:schemeClr>
                 </a:solidFill>
               </a:rPr>
-              <a:t>Azure DevOps </a:t>
-            </a:r>
-            <a:r>
-              <a:rPr lang="en-US" dirty="0" smtClean="0">
-                <a:solidFill>
-                  <a:srgbClr val="00B050"/>
-                </a:solidFill>
-              </a:rPr>
-              <a:t>Project X “before”</a:t>
+              <a:t>Azure DevOps Project X “before”</a:t>
             </a:r>
             <a:endParaRPr lang="en-US" dirty="0">
               <a:solidFill>
-                <a:srgbClr val="00B050"/>
+                <a:schemeClr val="bg1">
+                  <a:lumMod val="65000"/>
+                </a:schemeClr>
               </a:solidFill>
             </a:endParaRPr>
           </a:p>
@@ -6269,11 +6267,15 @@
             <a:avLst/>
           </a:prstGeom>
           <a:solidFill>
-            <a:srgbClr val="00B050"/>
+            <a:schemeClr val="bg1">
+              <a:lumMod val="65000"/>
+            </a:schemeClr>
           </a:solidFill>
           <a:ln w="28575">
             <a:solidFill>
-              <a:srgbClr val="00B050"/>
+              <a:schemeClr val="bg1">
+                <a:lumMod val="65000"/>
+              </a:schemeClr>
             </a:solidFill>
           </a:ln>
         </p:spPr>
@@ -6325,42 +6327,22 @@
           <a:lstStyle/>
           <a:p>
             <a:r>
-              <a:rPr lang="en-US" sz="1600" dirty="0" smtClean="0">
-                <a:solidFill>
-                  <a:schemeClr val="bg1"/>
-                </a:solidFill>
-              </a:rPr>
+              <a:rPr lang="en-US" sz="1600" dirty="0" smtClean="0"/>
               <a:t>Project Administrators</a:t>
             </a:r>
           </a:p>
           <a:p>
-            <a:endParaRPr lang="en-US" sz="1600" dirty="0">
-              <a:solidFill>
-                <a:schemeClr val="bg1"/>
-              </a:solidFill>
-            </a:endParaRPr>
-          </a:p>
-          <a:p>
-            <a:endParaRPr lang="en-US" sz="1600" dirty="0">
-              <a:solidFill>
-                <a:schemeClr val="bg1"/>
-              </a:solidFill>
-            </a:endParaRPr>
-          </a:p>
-          <a:p>
-            <a:r>
-              <a:rPr lang="en-US" sz="1600" dirty="0" smtClean="0">
-                <a:solidFill>
-                  <a:schemeClr val="bg1"/>
-                </a:solidFill>
-              </a:rPr>
+            <a:endParaRPr lang="en-US" sz="1600" dirty="0"/>
+          </a:p>
+          <a:p>
+            <a:endParaRPr lang="en-US" sz="1600" dirty="0"/>
+          </a:p>
+          <a:p>
+            <a:r>
+              <a:rPr lang="en-US" sz="1600" dirty="0" smtClean="0"/>
               <a:t>Contributors</a:t>
             </a:r>
-            <a:endParaRPr lang="en-US" sz="1600" dirty="0">
-              <a:solidFill>
-                <a:schemeClr val="bg1"/>
-              </a:solidFill>
-            </a:endParaRPr>
+            <a:endParaRPr lang="en-US" sz="1600" dirty="0"/>
           </a:p>
         </p:txBody>
       </p:sp>
@@ -6461,7 +6443,9 @@
             <a:r>
               <a:rPr lang="en-US" dirty="0" smtClean="0">
                 <a:solidFill>
-                  <a:srgbClr val="0070C0"/>
+                  <a:schemeClr val="bg1">
+                    <a:lumMod val="65000"/>
+                  </a:schemeClr>
                 </a:solidFill>
               </a:rPr>
               <a:t>D</a:t>
@@ -6469,7 +6453,9 @@
             <a:r>
               <a:rPr lang="en-US" dirty="0" smtClean="0">
                 <a:solidFill>
-                  <a:srgbClr val="0070C0"/>
+                  <a:schemeClr val="bg1">
+                    <a:lumMod val="65000"/>
+                  </a:schemeClr>
                 </a:solidFill>
                 <a:sym typeface="Webdings" panose="05030102010509060703" pitchFamily="18" charset="2"/>
               </a:rPr>
@@ -6478,14 +6464,18 @@
             <a:r>
               <a:rPr lang="en-US" dirty="0" smtClean="0">
                 <a:solidFill>
-                  <a:srgbClr val="0070C0"/>
+                  <a:schemeClr val="bg1">
+                    <a:lumMod val="65000"/>
+                  </a:schemeClr>
                 </a:solidFill>
               </a:rPr>
               <a:t>RIFT CONFIG</a:t>
             </a:r>
             <a:endParaRPr lang="en-US" dirty="0">
               <a:solidFill>
-                <a:srgbClr val="0070C0"/>
+                <a:schemeClr val="bg1">
+                  <a:lumMod val="65000"/>
+                </a:schemeClr>
               </a:solidFill>
             </a:endParaRPr>
           </a:p>
@@ -6964,22 +6954,18 @@
             <a:r>
               <a:rPr lang="en-US" dirty="0" smtClean="0">
                 <a:solidFill>
-                  <a:srgbClr val="00B050"/>
+                  <a:schemeClr val="bg1">
+                    <a:lumMod val="65000"/>
+                  </a:schemeClr>
                 </a:solidFill>
               </a:rPr>
-              <a:t>Azure DevOps Project </a:t>
-            </a:r>
-            <a:r>
-              <a:rPr lang="en-US" dirty="0" smtClean="0">
-                <a:solidFill>
-                  <a:srgbClr val="00B050"/>
-                </a:solidFill>
-              </a:rPr>
-              <a:t>X “after”</a:t>
+              <a:t>Azure DevOps Project X “after”</a:t>
             </a:r>
             <a:endParaRPr lang="en-US" dirty="0">
               <a:solidFill>
-                <a:srgbClr val="00B050"/>
+                <a:schemeClr val="bg1">
+                  <a:lumMod val="65000"/>
+                </a:schemeClr>
               </a:solidFill>
             </a:endParaRPr>
           </a:p>
@@ -7110,11 +7096,15 @@
             <a:avLst/>
           </a:prstGeom>
           <a:solidFill>
-            <a:srgbClr val="00B050"/>
+            <a:schemeClr val="bg1">
+              <a:lumMod val="65000"/>
+            </a:schemeClr>
           </a:solidFill>
           <a:ln w="28575">
             <a:solidFill>
-              <a:srgbClr val="00B050"/>
+              <a:schemeClr val="bg1">
+                <a:lumMod val="65000"/>
+              </a:schemeClr>
             </a:solidFill>
           </a:ln>
         </p:spPr>
@@ -7166,167 +7156,87 @@
           <a:lstStyle/>
           <a:p>
             <a:r>
-              <a:rPr lang="en-US" sz="1600" dirty="0" smtClean="0">
-                <a:solidFill>
-                  <a:schemeClr val="bg1"/>
-                </a:solidFill>
-              </a:rPr>
+              <a:rPr lang="en-US" sz="1600" dirty="0" smtClean="0"/>
               <a:t>Project Administrators</a:t>
             </a:r>
           </a:p>
           <a:p>
-            <a:endParaRPr lang="en-US" sz="1000" dirty="0" smtClean="0">
-              <a:solidFill>
-                <a:schemeClr val="bg1"/>
-              </a:solidFill>
-            </a:endParaRPr>
-          </a:p>
-          <a:p>
-            <a:r>
-              <a:rPr lang="en-US" sz="1000" dirty="0">
-                <a:solidFill>
-                  <a:schemeClr val="bg1"/>
-                </a:solidFill>
-              </a:rPr>
+            <a:endParaRPr lang="en-US" sz="1000" dirty="0" smtClean="0"/>
+          </a:p>
+          <a:p>
+            <a:r>
+              <a:rPr lang="en-US" sz="1000" dirty="0"/>
               <a:t> </a:t>
             </a:r>
             <a:r>
-              <a:rPr lang="en-US" sz="1000" dirty="0" smtClean="0">
-                <a:solidFill>
-                  <a:schemeClr val="bg1"/>
-                </a:solidFill>
-              </a:rPr>
+              <a:rPr lang="en-US" sz="1000" dirty="0" smtClean="0"/>
               <a:t>          </a:t>
             </a:r>
           </a:p>
           <a:p>
-            <a:endParaRPr lang="en-US" sz="1000" dirty="0">
-              <a:solidFill>
-                <a:schemeClr val="bg1"/>
-              </a:solidFill>
-            </a:endParaRPr>
-          </a:p>
-          <a:p>
-            <a:r>
-              <a:rPr lang="en-US" sz="1600" dirty="0" smtClean="0">
-                <a:solidFill>
-                  <a:schemeClr val="bg1"/>
-                </a:solidFill>
-              </a:rPr>
+            <a:endParaRPr lang="en-US" sz="1000" dirty="0"/>
+          </a:p>
+          <a:p>
+            <a:r>
+              <a:rPr lang="en-US" sz="1600" dirty="0" smtClean="0"/>
               <a:t>Contributors</a:t>
             </a:r>
           </a:p>
           <a:p>
-            <a:endParaRPr lang="en-US" sz="1000" dirty="0" smtClean="0">
-              <a:solidFill>
-                <a:schemeClr val="bg1"/>
-              </a:solidFill>
-            </a:endParaRPr>
-          </a:p>
-          <a:p>
-            <a:r>
-              <a:rPr lang="en-US" sz="1000" dirty="0" smtClean="0">
-                <a:solidFill>
-                  <a:schemeClr val="bg1"/>
-                </a:solidFill>
-              </a:rPr>
+            <a:endParaRPr lang="en-US" sz="1000" dirty="0" smtClean="0"/>
+          </a:p>
+          <a:p>
+            <a:r>
+              <a:rPr lang="en-US" sz="1000" dirty="0" smtClean="0"/>
               <a:t>           - missing</a:t>
             </a:r>
           </a:p>
           <a:p>
-            <a:endParaRPr lang="en-US" sz="1000" dirty="0">
-              <a:solidFill>
-                <a:schemeClr val="bg1"/>
-              </a:solidFill>
-            </a:endParaRPr>
-          </a:p>
-          <a:p>
-            <a:r>
-              <a:rPr lang="en-US" sz="1000" dirty="0" smtClean="0">
-                <a:solidFill>
-                  <a:schemeClr val="bg1"/>
-                </a:solidFill>
-              </a:rPr>
+            <a:endParaRPr lang="en-US" sz="1000" dirty="0"/>
+          </a:p>
+          <a:p>
+            <a:r>
+              <a:rPr lang="en-US" sz="1000" dirty="0" smtClean="0"/>
               <a:t>           + additional</a:t>
             </a:r>
           </a:p>
           <a:p>
-            <a:endParaRPr lang="en-US" sz="1600" dirty="0" smtClean="0">
-              <a:solidFill>
-                <a:schemeClr val="bg1"/>
-              </a:solidFill>
-            </a:endParaRPr>
-          </a:p>
-          <a:p>
-            <a:r>
-              <a:rPr lang="en-US" sz="1600" dirty="0" smtClean="0">
-                <a:solidFill>
-                  <a:schemeClr val="bg1"/>
-                </a:solidFill>
-              </a:rPr>
+            <a:endParaRPr lang="en-US" sz="1600" dirty="0" smtClean="0"/>
+          </a:p>
+          <a:p>
+            <a:r>
+              <a:rPr lang="en-US" sz="1600" dirty="0" smtClean="0"/>
               <a:t>Readers</a:t>
             </a:r>
             <a:r>
-              <a:rPr lang="en-US" sz="1000" dirty="0" smtClean="0">
-                <a:solidFill>
-                  <a:schemeClr val="bg1"/>
-                </a:solidFill>
-              </a:rPr>
+              <a:rPr lang="en-US" sz="1000" dirty="0" smtClean="0"/>
               <a:t>  + additional</a:t>
             </a:r>
-            <a:endParaRPr lang="en-US" sz="1600" dirty="0" smtClean="0">
-              <a:solidFill>
-                <a:schemeClr val="bg1"/>
-              </a:solidFill>
-            </a:endParaRPr>
-          </a:p>
-          <a:p>
-            <a:endParaRPr lang="en-US" sz="1000" dirty="0" smtClean="0">
-              <a:solidFill>
-                <a:schemeClr val="bg1"/>
-              </a:solidFill>
-            </a:endParaRPr>
-          </a:p>
-          <a:p>
-            <a:r>
-              <a:rPr lang="en-US" sz="1000" dirty="0" smtClean="0">
-                <a:solidFill>
-                  <a:schemeClr val="bg1"/>
-                </a:solidFill>
-              </a:rPr>
+            <a:endParaRPr lang="en-US" sz="1600" dirty="0" smtClean="0"/>
+          </a:p>
+          <a:p>
+            <a:endParaRPr lang="en-US" sz="1000" dirty="0" smtClean="0"/>
+          </a:p>
+          <a:p>
+            <a:r>
+              <a:rPr lang="en-US" sz="1000" dirty="0" smtClean="0"/>
               <a:t>           + additional </a:t>
             </a:r>
           </a:p>
           <a:p>
-            <a:endParaRPr lang="en-US" sz="1000" dirty="0" smtClean="0">
-              <a:solidFill>
-                <a:schemeClr val="bg1"/>
-              </a:solidFill>
-            </a:endParaRPr>
-          </a:p>
-          <a:p>
-            <a:r>
-              <a:rPr lang="en-US" sz="1000" dirty="0" smtClean="0">
-                <a:solidFill>
-                  <a:schemeClr val="bg1"/>
-                </a:solidFill>
-              </a:rPr>
+            <a:endParaRPr lang="en-US" sz="1000" dirty="0" smtClean="0"/>
+          </a:p>
+          <a:p>
+            <a:r>
+              <a:rPr lang="en-US" sz="1000" dirty="0" smtClean="0"/>
               <a:t>           + additional</a:t>
             </a:r>
           </a:p>
           <a:p>
-            <a:endParaRPr lang="en-US" sz="1000" dirty="0" smtClean="0">
-              <a:solidFill>
-                <a:schemeClr val="bg1"/>
-              </a:solidFill>
-            </a:endParaRPr>
-          </a:p>
-          <a:p>
-            <a:endParaRPr lang="en-US" sz="1000" dirty="0">
-              <a:solidFill>
-                <a:schemeClr val="bg1"/>
-              </a:solidFill>
-            </a:endParaRPr>
+            <a:endParaRPr lang="en-US" sz="1000" dirty="0" smtClean="0"/>
+          </a:p>
+          <a:p>
+            <a:endParaRPr lang="en-US" sz="1000" dirty="0"/>
           </a:p>
         </p:txBody>
       </p:sp>
@@ -7526,6 +7436,79 @@
           </p:spPr>
         </p:pic>
       </p:grpSp>
+      <p:sp>
+        <p:nvSpPr>
+          <p:cNvPr id="75" name="TextBox 74"/>
+          <p:cNvSpPr txBox="1"/>
+          <p:nvPr/>
+        </p:nvSpPr>
+        <p:spPr>
+          <a:xfrm>
+            <a:off x="5752423" y="4213998"/>
+            <a:ext cx="1754968" cy="369332"/>
+          </a:xfrm>
+          <a:prstGeom prst="rect">
+            <a:avLst/>
+          </a:prstGeom>
+          <a:noFill/>
+        </p:spPr>
+        <p:txBody>
+          <a:bodyPr wrap="none" rtlCol="0">
+            <a:spAutoFit/>
+          </a:bodyPr>
+          <a:lstStyle/>
+          <a:p>
+            <a:r>
+              <a:rPr lang="en-US" dirty="0" smtClean="0">
+                <a:solidFill>
+                  <a:schemeClr val="bg1">
+                    <a:lumMod val="65000"/>
+                  </a:schemeClr>
+                </a:solidFill>
+              </a:rPr>
+              <a:t>D</a:t>
+            </a:r>
+            <a:r>
+              <a:rPr lang="en-US" dirty="0" smtClean="0">
+                <a:solidFill>
+                  <a:schemeClr val="bg1">
+                    <a:lumMod val="65000"/>
+                  </a:schemeClr>
+                </a:solidFill>
+                <a:sym typeface="Webdings" panose="05030102010509060703" pitchFamily="18" charset="2"/>
+              </a:rPr>
+              <a:t></a:t>
+            </a:r>
+            <a:r>
+              <a:rPr lang="en-US" dirty="0" smtClean="0">
+                <a:solidFill>
+                  <a:schemeClr val="bg1">
+                    <a:lumMod val="65000"/>
+                  </a:schemeClr>
+                </a:solidFill>
+              </a:rPr>
+              <a:t>RIFT </a:t>
+            </a:r>
+            <a:r>
+              <a:rPr lang="en-US" dirty="0" smtClean="0">
+                <a:solidFill>
+                  <a:schemeClr val="bg1">
+                    <a:lumMod val="65000"/>
+                  </a:schemeClr>
+                </a:solidFill>
+              </a:rPr>
+              <a:t>REPORT</a:t>
+            </a:r>
+            <a:endParaRPr lang="en-US" dirty="0">
+              <a:solidFill>
+                <a:schemeClr val="bg1">
+                  <a:lumMod val="65000"/>
+                </a:schemeClr>
+              </a:solidFill>
+            </a:endParaRPr>
+          </a:p>
+        </p:txBody>
+      </p:sp>
     </p:spTree>
     <p:extLst>
       <p:ext uri="{BB962C8B-B14F-4D97-AF65-F5344CB8AC3E}">

</xml_diff>

<commit_message>
Change to even lighter gray.
</commit_message>
<xml_diff>
--- a/images/illustrations.pptx
+++ b/images/illustrations.pptx
@@ -2987,13 +2987,13 @@
           </a:prstGeom>
           <a:solidFill>
             <a:schemeClr val="bg1">
-              <a:lumMod val="65000"/>
+              <a:lumMod val="85000"/>
             </a:schemeClr>
           </a:solidFill>
           <a:ln w="28575">
             <a:solidFill>
               <a:schemeClr val="bg1">
-                <a:lumMod val="65000"/>
+                <a:lumMod val="85000"/>
               </a:schemeClr>
             </a:solidFill>
           </a:ln>
@@ -3676,13 +3676,13 @@
           </a:prstGeom>
           <a:solidFill>
             <a:schemeClr val="bg1">
-              <a:lumMod val="65000"/>
+              <a:lumMod val="85000"/>
             </a:schemeClr>
           </a:solidFill>
           <a:ln w="28575">
             <a:solidFill>
               <a:schemeClr val="bg1">
-                <a:lumMod val="65000"/>
+                <a:lumMod val="85000"/>
               </a:schemeClr>
             </a:solidFill>
           </a:ln>
@@ -4367,17 +4367,7 @@
                   </a:schemeClr>
                 </a:solidFill>
               </a:rPr>
-              <a:t>RIFT </a:t>
-            </a:r>
-            <a:r>
-              <a:rPr lang="en-US" dirty="0" smtClean="0">
-                <a:solidFill>
-                  <a:schemeClr val="bg1">
-                    <a:lumMod val="65000"/>
-                  </a:schemeClr>
-                </a:solidFill>
-              </a:rPr>
-              <a:t>REPORT</a:t>
+              <a:t>RIFT REPORT</a:t>
             </a:r>
             <a:endParaRPr lang="en-US" dirty="0">
               <a:solidFill>
@@ -4435,13 +4425,13 @@
           </a:prstGeom>
           <a:solidFill>
             <a:schemeClr val="bg1">
-              <a:lumMod val="65000"/>
+              <a:lumMod val="85000"/>
             </a:schemeClr>
           </a:solidFill>
           <a:ln w="28575">
             <a:solidFill>
               <a:schemeClr val="bg1">
-                <a:lumMod val="65000"/>
+                <a:lumMod val="85000"/>
               </a:schemeClr>
             </a:solidFill>
           </a:ln>
@@ -5076,13 +5066,13 @@
           </a:prstGeom>
           <a:solidFill>
             <a:schemeClr val="bg1">
-              <a:lumMod val="65000"/>
+              <a:lumMod val="85000"/>
             </a:schemeClr>
           </a:solidFill>
           <a:ln w="28575">
             <a:solidFill>
               <a:schemeClr val="bg1">
-                <a:lumMod val="65000"/>
+                <a:lumMod val="85000"/>
               </a:schemeClr>
             </a:solidFill>
           </a:ln>
@@ -5611,17 +5601,7 @@
                   </a:schemeClr>
                 </a:solidFill>
               </a:rPr>
-              <a:t>RIFT </a:t>
-            </a:r>
-            <a:r>
-              <a:rPr lang="en-US" dirty="0" smtClean="0">
-                <a:solidFill>
-                  <a:schemeClr val="bg1">
-                    <a:lumMod val="65000"/>
-                  </a:schemeClr>
-                </a:solidFill>
-              </a:rPr>
-              <a:t>REPORT</a:t>
+              <a:t>RIFT REPORT</a:t>
             </a:r>
             <a:endParaRPr lang="en-US" dirty="0">
               <a:solidFill>
@@ -6268,13 +6248,13 @@
           </a:prstGeom>
           <a:solidFill>
             <a:schemeClr val="bg1">
-              <a:lumMod val="65000"/>
+              <a:lumMod val="85000"/>
             </a:schemeClr>
           </a:solidFill>
           <a:ln w="28575">
             <a:solidFill>
               <a:schemeClr val="bg1">
-                <a:lumMod val="65000"/>
+                <a:lumMod val="85000"/>
               </a:schemeClr>
             </a:solidFill>
           </a:ln>
@@ -7097,13 +7077,13 @@
           </a:prstGeom>
           <a:solidFill>
             <a:schemeClr val="bg1">
-              <a:lumMod val="65000"/>
+              <a:lumMod val="85000"/>
             </a:schemeClr>
           </a:solidFill>
           <a:ln w="28575">
             <a:solidFill>
               <a:schemeClr val="bg1">
-                <a:lumMod val="65000"/>
+                <a:lumMod val="85000"/>
               </a:schemeClr>
             </a:solidFill>
           </a:ln>
@@ -7487,17 +7467,7 @@
                   </a:schemeClr>
                 </a:solidFill>
               </a:rPr>
-              <a:t>RIFT </a:t>
-            </a:r>
-            <a:r>
-              <a:rPr lang="en-US" dirty="0" smtClean="0">
-                <a:solidFill>
-                  <a:schemeClr val="bg1">
-                    <a:lumMod val="65000"/>
-                  </a:schemeClr>
-                </a:solidFill>
-              </a:rPr>
-              <a:t>REPORT</a:t>
+              <a:t>RIFT REPORT</a:t>
             </a:r>
             <a:endParaRPr lang="en-US" dirty="0">
               <a:solidFill>

</xml_diff>

<commit_message>
Adjust image text with image gray.
</commit_message>
<xml_diff>
--- a/images/illustrations.pptx
+++ b/images/illustrations.pptx
@@ -3644,7 +3644,7 @@
               <a:rPr lang="en-US" dirty="0" smtClean="0">
                 <a:solidFill>
                   <a:schemeClr val="bg1">
-                    <a:lumMod val="65000"/>
+                    <a:lumMod val="75000"/>
                   </a:schemeClr>
                 </a:solidFill>
               </a:rPr>
@@ -3653,7 +3653,7 @@
             <a:endParaRPr lang="en-US" dirty="0">
               <a:solidFill>
                 <a:schemeClr val="bg1">
-                  <a:lumMod val="65000"/>
+                  <a:lumMod val="75000"/>
                 </a:schemeClr>
               </a:solidFill>
             </a:endParaRPr>
@@ -3852,7 +3852,7 @@
               <a:rPr lang="en-US" dirty="0" smtClean="0">
                 <a:solidFill>
                   <a:schemeClr val="bg1">
-                    <a:lumMod val="65000"/>
+                    <a:lumMod val="75000"/>
                   </a:schemeClr>
                 </a:solidFill>
               </a:rPr>
@@ -3862,7 +3862,7 @@
               <a:rPr lang="en-US" dirty="0" smtClean="0">
                 <a:solidFill>
                   <a:schemeClr val="bg1">
-                    <a:lumMod val="65000"/>
+                    <a:lumMod val="75000"/>
                   </a:schemeClr>
                 </a:solidFill>
                 <a:sym typeface="Webdings" panose="05030102010509060703" pitchFamily="18" charset="2"/>
@@ -3873,7 +3873,7 @@
               <a:rPr lang="en-US" dirty="0" smtClean="0">
                 <a:solidFill>
                   <a:schemeClr val="bg1">
-                    <a:lumMod val="65000"/>
+                    <a:lumMod val="75000"/>
                   </a:schemeClr>
                 </a:solidFill>
               </a:rPr>
@@ -3882,7 +3882,7 @@
             <a:endParaRPr lang="en-US" dirty="0">
               <a:solidFill>
                 <a:schemeClr val="bg1">
-                  <a:lumMod val="65000"/>
+                  <a:lumMod val="75000"/>
                 </a:schemeClr>
               </a:solidFill>
             </a:endParaRPr>
@@ -4342,7 +4342,7 @@
               <a:rPr lang="en-US" dirty="0" smtClean="0">
                 <a:solidFill>
                   <a:schemeClr val="bg1">
-                    <a:lumMod val="65000"/>
+                    <a:lumMod val="75000"/>
                   </a:schemeClr>
                 </a:solidFill>
               </a:rPr>
@@ -4352,7 +4352,7 @@
               <a:rPr lang="en-US" dirty="0" smtClean="0">
                 <a:solidFill>
                   <a:schemeClr val="bg1">
-                    <a:lumMod val="65000"/>
+                    <a:lumMod val="75000"/>
                   </a:schemeClr>
                 </a:solidFill>
                 <a:sym typeface="Webdings" panose="05030102010509060703" pitchFamily="18" charset="2"/>
@@ -4363,7 +4363,7 @@
               <a:rPr lang="en-US" dirty="0" smtClean="0">
                 <a:solidFill>
                   <a:schemeClr val="bg1">
-                    <a:lumMod val="65000"/>
+                    <a:lumMod val="75000"/>
                   </a:schemeClr>
                 </a:solidFill>
               </a:rPr>
@@ -4372,7 +4372,7 @@
             <a:endParaRPr lang="en-US" dirty="0">
               <a:solidFill>
                 <a:schemeClr val="bg1">
-                  <a:lumMod val="65000"/>
+                  <a:lumMod val="75000"/>
                 </a:schemeClr>
               </a:solidFill>
             </a:endParaRPr>
@@ -5016,7 +5016,7 @@
         </p:nvSpPr>
         <p:spPr>
           <a:xfrm>
-            <a:off x="5138830" y="4687838"/>
+            <a:off x="5138830" y="4678425"/>
             <a:ext cx="2386615" cy="369332"/>
           </a:xfrm>
           <a:prstGeom prst="rect">
@@ -5034,7 +5034,7 @@
               <a:rPr lang="en-US" dirty="0" smtClean="0">
                 <a:solidFill>
                   <a:schemeClr val="bg1">
-                    <a:lumMod val="50000"/>
+                    <a:lumMod val="75000"/>
                   </a:schemeClr>
                 </a:solidFill>
               </a:rPr>
@@ -5043,7 +5043,7 @@
             <a:endParaRPr lang="en-US" dirty="0">
               <a:solidFill>
                 <a:schemeClr val="bg1">
-                  <a:lumMod val="50000"/>
+                  <a:lumMod val="75000"/>
                 </a:schemeClr>
               </a:solidFill>
             </a:endParaRPr>
@@ -5224,7 +5224,7 @@
         </p:nvSpPr>
         <p:spPr>
           <a:xfrm>
-            <a:off x="1077481" y="3899186"/>
+            <a:off x="1077481" y="3889773"/>
             <a:ext cx="1743939" cy="369332"/>
           </a:xfrm>
           <a:prstGeom prst="rect">
@@ -5242,7 +5242,7 @@
               <a:rPr lang="en-US" dirty="0" smtClean="0">
                 <a:solidFill>
                   <a:schemeClr val="bg1">
-                    <a:lumMod val="50000"/>
+                    <a:lumMod val="75000"/>
                   </a:schemeClr>
                 </a:solidFill>
               </a:rPr>
@@ -5252,7 +5252,7 @@
               <a:rPr lang="en-US" dirty="0" smtClean="0">
                 <a:solidFill>
                   <a:schemeClr val="bg1">
-                    <a:lumMod val="50000"/>
+                    <a:lumMod val="75000"/>
                   </a:schemeClr>
                 </a:solidFill>
                 <a:sym typeface="Webdings" panose="05030102010509060703" pitchFamily="18" charset="2"/>
@@ -5263,7 +5263,7 @@
               <a:rPr lang="en-US" dirty="0" smtClean="0">
                 <a:solidFill>
                   <a:schemeClr val="bg1">
-                    <a:lumMod val="50000"/>
+                    <a:lumMod val="75000"/>
                   </a:schemeClr>
                 </a:solidFill>
               </a:rPr>
@@ -5272,7 +5272,7 @@
             <a:endParaRPr lang="en-US" dirty="0">
               <a:solidFill>
                 <a:schemeClr val="bg1">
-                  <a:lumMod val="50000"/>
+                  <a:lumMod val="75000"/>
                 </a:schemeClr>
               </a:solidFill>
             </a:endParaRPr>
@@ -5576,7 +5576,7 @@
               <a:rPr lang="en-US" dirty="0" smtClean="0">
                 <a:solidFill>
                   <a:schemeClr val="bg1">
-                    <a:lumMod val="65000"/>
+                    <a:lumMod val="75000"/>
                   </a:schemeClr>
                 </a:solidFill>
               </a:rPr>
@@ -5586,7 +5586,7 @@
               <a:rPr lang="en-US" dirty="0" smtClean="0">
                 <a:solidFill>
                   <a:schemeClr val="bg1">
-                    <a:lumMod val="65000"/>
+                    <a:lumMod val="75000"/>
                   </a:schemeClr>
                 </a:solidFill>
                 <a:sym typeface="Webdings" panose="05030102010509060703" pitchFamily="18" charset="2"/>
@@ -5597,7 +5597,7 @@
               <a:rPr lang="en-US" dirty="0" smtClean="0">
                 <a:solidFill>
                   <a:schemeClr val="bg1">
-                    <a:lumMod val="65000"/>
+                    <a:lumMod val="75000"/>
                   </a:schemeClr>
                 </a:solidFill>
               </a:rPr>
@@ -5606,7 +5606,7 @@
             <a:endParaRPr lang="en-US" dirty="0">
               <a:solidFill>
                 <a:schemeClr val="bg1">
-                  <a:lumMod val="65000"/>
+                  <a:lumMod val="75000"/>
                 </a:schemeClr>
               </a:solidFill>
             </a:endParaRPr>
@@ -6198,7 +6198,7 @@
         </p:nvSpPr>
         <p:spPr>
           <a:xfrm>
-            <a:off x="1265491" y="4206466"/>
+            <a:off x="1338456" y="4206466"/>
             <a:ext cx="3247107" cy="369332"/>
           </a:xfrm>
           <a:prstGeom prst="rect">
@@ -6216,7 +6216,7 @@
               <a:rPr lang="en-US" dirty="0" smtClean="0">
                 <a:solidFill>
                   <a:schemeClr val="bg1">
-                    <a:lumMod val="65000"/>
+                    <a:lumMod val="75000"/>
                   </a:schemeClr>
                 </a:solidFill>
               </a:rPr>
@@ -6225,7 +6225,7 @@
             <a:endParaRPr lang="en-US" dirty="0">
               <a:solidFill>
                 <a:schemeClr val="bg1">
-                  <a:lumMod val="65000"/>
+                  <a:lumMod val="75000"/>
                 </a:schemeClr>
               </a:solidFill>
             </a:endParaRPr>
@@ -6406,7 +6406,7 @@
         </p:nvSpPr>
         <p:spPr>
           <a:xfrm>
-            <a:off x="-1374465" y="3459774"/>
+            <a:off x="-1301500" y="3459774"/>
             <a:ext cx="1743939" cy="369332"/>
           </a:xfrm>
           <a:prstGeom prst="rect">
@@ -6424,7 +6424,7 @@
               <a:rPr lang="en-US" dirty="0" smtClean="0">
                 <a:solidFill>
                   <a:schemeClr val="bg1">
-                    <a:lumMod val="65000"/>
+                    <a:lumMod val="75000"/>
                   </a:schemeClr>
                 </a:solidFill>
               </a:rPr>
@@ -6434,7 +6434,7 @@
               <a:rPr lang="en-US" dirty="0" smtClean="0">
                 <a:solidFill>
                   <a:schemeClr val="bg1">
-                    <a:lumMod val="65000"/>
+                    <a:lumMod val="75000"/>
                   </a:schemeClr>
                 </a:solidFill>
                 <a:sym typeface="Webdings" panose="05030102010509060703" pitchFamily="18" charset="2"/>
@@ -6445,7 +6445,7 @@
               <a:rPr lang="en-US" dirty="0" smtClean="0">
                 <a:solidFill>
                   <a:schemeClr val="bg1">
-                    <a:lumMod val="65000"/>
+                    <a:lumMod val="75000"/>
                   </a:schemeClr>
                 </a:solidFill>
               </a:rPr>
@@ -6454,7 +6454,7 @@
             <a:endParaRPr lang="en-US" dirty="0">
               <a:solidFill>
                 <a:schemeClr val="bg1">
-                  <a:lumMod val="65000"/>
+                  <a:lumMod val="75000"/>
                 </a:schemeClr>
               </a:solidFill>
             </a:endParaRPr>
@@ -6935,7 +6935,7 @@
               <a:rPr lang="en-US" dirty="0" smtClean="0">
                 <a:solidFill>
                   <a:schemeClr val="bg1">
-                    <a:lumMod val="65000"/>
+                    <a:lumMod val="75000"/>
                   </a:schemeClr>
                 </a:solidFill>
               </a:rPr>
@@ -6944,7 +6944,7 @@
             <a:endParaRPr lang="en-US" dirty="0">
               <a:solidFill>
                 <a:schemeClr val="bg1">
-                  <a:lumMod val="65000"/>
+                  <a:lumMod val="75000"/>
                 </a:schemeClr>
               </a:solidFill>
             </a:endParaRPr>
@@ -7424,7 +7424,7 @@
         </p:nvSpPr>
         <p:spPr>
           <a:xfrm>
-            <a:off x="5752423" y="4213998"/>
+            <a:off x="5825388" y="4213998"/>
             <a:ext cx="1754968" cy="369332"/>
           </a:xfrm>
           <a:prstGeom prst="rect">
@@ -7442,7 +7442,7 @@
               <a:rPr lang="en-US" dirty="0" smtClean="0">
                 <a:solidFill>
                   <a:schemeClr val="bg1">
-                    <a:lumMod val="65000"/>
+                    <a:lumMod val="75000"/>
                   </a:schemeClr>
                 </a:solidFill>
               </a:rPr>
@@ -7452,7 +7452,7 @@
               <a:rPr lang="en-US" dirty="0" smtClean="0">
                 <a:solidFill>
                   <a:schemeClr val="bg1">
-                    <a:lumMod val="65000"/>
+                    <a:lumMod val="75000"/>
                   </a:schemeClr>
                 </a:solidFill>
                 <a:sym typeface="Webdings" panose="05030102010509060703" pitchFamily="18" charset="2"/>
@@ -7463,7 +7463,7 @@
               <a:rPr lang="en-US" dirty="0" smtClean="0">
                 <a:solidFill>
                   <a:schemeClr val="bg1">
-                    <a:lumMod val="65000"/>
+                    <a:lumMod val="75000"/>
                   </a:schemeClr>
                 </a:solidFill>
               </a:rPr>
@@ -7472,7 +7472,7 @@
             <a:endParaRPr lang="en-US" dirty="0">
               <a:solidFill>
                 <a:schemeClr val="bg1">
-                  <a:lumMod val="65000"/>
+                  <a:lumMod val="75000"/>
                 </a:schemeClr>
               </a:solidFill>
             </a:endParaRPr>

</xml_diff>